<commit_message>
term project : bubble class
term project : bubble class
</commit_message>
<xml_diff>
--- a/project/proposal/프레젠테이션1.pptx
+++ b/project/proposal/프레젠테이션1.pptx
@@ -251,7 +251,7 @@
           <a:p>
             <a:fld id="{A4AC560A-16E7-4F3F-B759-B2BF366DF7D9}" type="datetimeFigureOut">
               <a:rPr lang="ko-KR" altLang="en-US" smtClean="0"/>
-              <a:t>2018-09-27</a:t>
+              <a:t>2018-11-05</a:t>
             </a:fld>
             <a:endParaRPr lang="ko-KR" altLang="en-US"/>
           </a:p>
@@ -421,7 +421,7 @@
           <a:p>
             <a:fld id="{A4AC560A-16E7-4F3F-B759-B2BF366DF7D9}" type="datetimeFigureOut">
               <a:rPr lang="ko-KR" altLang="en-US" smtClean="0"/>
-              <a:t>2018-09-27</a:t>
+              <a:t>2018-11-05</a:t>
             </a:fld>
             <a:endParaRPr lang="ko-KR" altLang="en-US"/>
           </a:p>
@@ -601,7 +601,7 @@
           <a:p>
             <a:fld id="{A4AC560A-16E7-4F3F-B759-B2BF366DF7D9}" type="datetimeFigureOut">
               <a:rPr lang="ko-KR" altLang="en-US" smtClean="0"/>
-              <a:t>2018-09-27</a:t>
+              <a:t>2018-11-05</a:t>
             </a:fld>
             <a:endParaRPr lang="ko-KR" altLang="en-US"/>
           </a:p>
@@ -771,7 +771,7 @@
           <a:p>
             <a:fld id="{A4AC560A-16E7-4F3F-B759-B2BF366DF7D9}" type="datetimeFigureOut">
               <a:rPr lang="ko-KR" altLang="en-US" smtClean="0"/>
-              <a:t>2018-09-27</a:t>
+              <a:t>2018-11-05</a:t>
             </a:fld>
             <a:endParaRPr lang="ko-KR" altLang="en-US"/>
           </a:p>
@@ -1017,7 +1017,7 @@
           <a:p>
             <a:fld id="{A4AC560A-16E7-4F3F-B759-B2BF366DF7D9}" type="datetimeFigureOut">
               <a:rPr lang="ko-KR" altLang="en-US" smtClean="0"/>
-              <a:t>2018-09-27</a:t>
+              <a:t>2018-11-05</a:t>
             </a:fld>
             <a:endParaRPr lang="ko-KR" altLang="en-US"/>
           </a:p>
@@ -1249,7 +1249,7 @@
           <a:p>
             <a:fld id="{A4AC560A-16E7-4F3F-B759-B2BF366DF7D9}" type="datetimeFigureOut">
               <a:rPr lang="ko-KR" altLang="en-US" smtClean="0"/>
-              <a:t>2018-09-27</a:t>
+              <a:t>2018-11-05</a:t>
             </a:fld>
             <a:endParaRPr lang="ko-KR" altLang="en-US"/>
           </a:p>
@@ -1616,7 +1616,7 @@
           <a:p>
             <a:fld id="{A4AC560A-16E7-4F3F-B759-B2BF366DF7D9}" type="datetimeFigureOut">
               <a:rPr lang="ko-KR" altLang="en-US" smtClean="0"/>
-              <a:t>2018-09-27</a:t>
+              <a:t>2018-11-05</a:t>
             </a:fld>
             <a:endParaRPr lang="ko-KR" altLang="en-US"/>
           </a:p>
@@ -1734,7 +1734,7 @@
           <a:p>
             <a:fld id="{A4AC560A-16E7-4F3F-B759-B2BF366DF7D9}" type="datetimeFigureOut">
               <a:rPr lang="ko-KR" altLang="en-US" smtClean="0"/>
-              <a:t>2018-09-27</a:t>
+              <a:t>2018-11-05</a:t>
             </a:fld>
             <a:endParaRPr lang="ko-KR" altLang="en-US"/>
           </a:p>
@@ -1829,7 +1829,7 @@
           <a:p>
             <a:fld id="{A4AC560A-16E7-4F3F-B759-B2BF366DF7D9}" type="datetimeFigureOut">
               <a:rPr lang="ko-KR" altLang="en-US" smtClean="0"/>
-              <a:t>2018-09-27</a:t>
+              <a:t>2018-11-05</a:t>
             </a:fld>
             <a:endParaRPr lang="ko-KR" altLang="en-US"/>
           </a:p>
@@ -2106,7 +2106,7 @@
           <a:p>
             <a:fld id="{A4AC560A-16E7-4F3F-B759-B2BF366DF7D9}" type="datetimeFigureOut">
               <a:rPr lang="ko-KR" altLang="en-US" smtClean="0"/>
-              <a:t>2018-09-27</a:t>
+              <a:t>2018-11-05</a:t>
             </a:fld>
             <a:endParaRPr lang="ko-KR" altLang="en-US"/>
           </a:p>
@@ -2359,7 +2359,7 @@
           <a:p>
             <a:fld id="{A4AC560A-16E7-4F3F-B759-B2BF366DF7D9}" type="datetimeFigureOut">
               <a:rPr lang="ko-KR" altLang="en-US" smtClean="0"/>
-              <a:t>2018-09-27</a:t>
+              <a:t>2018-11-05</a:t>
             </a:fld>
             <a:endParaRPr lang="ko-KR" altLang="en-US"/>
           </a:p>
@@ -2582,7 +2582,7 @@
           <a:p>
             <a:fld id="{A4AC560A-16E7-4F3F-B759-B2BF366DF7D9}" type="datetimeFigureOut">
               <a:rPr lang="ko-KR" altLang="en-US" smtClean="0"/>
-              <a:t>2018-09-27</a:t>
+              <a:t>2018-11-05</a:t>
             </a:fld>
             <a:endParaRPr lang="ko-KR" altLang="en-US"/>
           </a:p>
@@ -3075,11 +3075,7 @@
             </a:r>
             <a:r>
               <a:rPr lang="ko-KR" altLang="en-US" sz="3600" smtClean="0"/>
-              <a:t>게임 </a:t>
-            </a:r>
-            <a:r>
-              <a:rPr lang="ko-KR" altLang="en-US" sz="3600" smtClean="0"/>
-              <a:t>프로그래밍</a:t>
+              <a:t>게임 프로그래밍</a:t>
             </a:r>
             <a:r>
               <a:rPr lang="en-US" altLang="ko-KR" sz="3600" dirty="0" smtClean="0"/>
@@ -3122,7 +3118,7 @@
         <p:spPr>
           <a:xfrm>
             <a:off x="1031938" y="1916456"/>
-            <a:ext cx="7507183" cy="1200329"/>
+            <a:ext cx="7518405" cy="1200329"/>
           </a:xfrm>
           <a:prstGeom prst="rect">
             <a:avLst/>
@@ -3144,8 +3140,12 @@
               <a:t> </a:t>
             </a:r>
             <a:r>
+              <a:rPr lang="en-US" altLang="ko-KR" sz="7200" b="1" smtClean="0"/>
+              <a:t>Bobble </a:t>
+            </a:r>
+            <a:r>
               <a:rPr lang="en-US" altLang="ko-KR" sz="7200" b="1" dirty="0" smtClean="0"/>
-              <a:t>Bubble 2</a:t>
+              <a:t>2</a:t>
             </a:r>
           </a:p>
         </p:txBody>
@@ -3628,11 +3628,7 @@
                       <a:pPr latinLnBrk="1"/>
                       <a:r>
                         <a:rPr lang="ko-KR" altLang="en-US" dirty="0" smtClean="0"/>
-                        <a:t>거품을 터트리는 조건을 세분화하여 거품 위에서 점프할 수 있는 조건을 별도로 </a:t>
-                      </a:r>
-                      <a:r>
-                        <a:rPr lang="ko-KR" altLang="en-US" dirty="0" smtClean="0"/>
-                        <a:t>제공</a:t>
+                        <a:t>거품을 터트리는 조건을 세분화하여 거품 위에서 점프할 수 있는 조건을 별도로 제공</a:t>
                       </a:r>
                       <a:r>
                         <a:rPr lang="en-US" altLang="ko-KR" dirty="0" smtClean="0"/>
@@ -5676,14 +5672,7 @@
                 <a:latin typeface="+mj-ea"/>
                 <a:ea typeface="+mj-ea"/>
               </a:rPr>
-              <a:t>개발 </a:t>
-            </a:r>
-            <a:r>
-              <a:rPr lang="ko-KR" altLang="en-US" sz="4800" b="1" dirty="0" smtClean="0">
-                <a:latin typeface="+mj-ea"/>
-                <a:ea typeface="+mj-ea"/>
-              </a:rPr>
-              <a:t>일정 </a:t>
+              <a:t>개발 일정 </a:t>
             </a:r>
             <a:r>
               <a:rPr lang="en-US" altLang="ko-KR" sz="4800" b="1" dirty="0" smtClean="0">
@@ -5692,10 +5681,6 @@
               </a:rPr>
               <a:t>1/2</a:t>
             </a:r>
-            <a:endParaRPr lang="en-US" altLang="ko-KR" sz="4800" b="1" dirty="0" smtClean="0">
-              <a:latin typeface="+mj-ea"/>
-              <a:ea typeface="+mj-ea"/>
-            </a:endParaRPr>
           </a:p>
         </p:txBody>
       </p:sp>
@@ -6071,11 +6056,7 @@
                       <a:pPr latinLnBrk="1"/>
                       <a:r>
                         <a:rPr lang="en-US" altLang="ko-KR" sz="1400" dirty="0" smtClean="0"/>
-                        <a:t>(</a:t>
-                      </a:r>
-                      <a:r>
-                        <a:rPr lang="en-US" altLang="ko-KR" sz="1400" dirty="0" smtClean="0"/>
-                        <a:t>10/8</a:t>
+                        <a:t>(10/8</a:t>
                       </a:r>
                       <a:r>
                         <a:rPr lang="en-US" altLang="ko-KR" sz="1400" baseline="0" dirty="0" smtClean="0"/>
@@ -6206,11 +6187,7 @@
                       <a:pPr latinLnBrk="1"/>
                       <a:r>
                         <a:rPr lang="en-US" altLang="ko-KR" sz="1400" dirty="0" smtClean="0"/>
-                        <a:t>(</a:t>
-                      </a:r>
-                      <a:r>
-                        <a:rPr lang="en-US" altLang="ko-KR" sz="1400" dirty="0" smtClean="0"/>
-                        <a:t>10/15</a:t>
+                        <a:t>(10/15</a:t>
                       </a:r>
                       <a:r>
                         <a:rPr lang="en-US" altLang="ko-KR" sz="1400" baseline="0" dirty="0" smtClean="0"/>
@@ -6358,11 +6335,7 @@
                       <a:pPr latinLnBrk="1"/>
                       <a:r>
                         <a:rPr lang="en-US" altLang="ko-KR" sz="1400" dirty="0" smtClean="0"/>
-                        <a:t>(</a:t>
-                      </a:r>
-                      <a:r>
-                        <a:rPr lang="en-US" altLang="ko-KR" sz="1400" dirty="0" smtClean="0"/>
-                        <a:t>10/22</a:t>
+                        <a:t>(10/22</a:t>
                       </a:r>
                       <a:r>
                         <a:rPr lang="en-US" altLang="ko-KR" sz="1400" baseline="0" dirty="0" smtClean="0"/>
@@ -6522,14 +6495,7 @@
                 <a:latin typeface="+mj-ea"/>
                 <a:ea typeface="+mj-ea"/>
               </a:rPr>
-              <a:t>개발 </a:t>
-            </a:r>
-            <a:r>
-              <a:rPr lang="ko-KR" altLang="en-US" sz="4800" b="1" dirty="0" smtClean="0">
-                <a:latin typeface="+mj-ea"/>
-                <a:ea typeface="+mj-ea"/>
-              </a:rPr>
-              <a:t>일정 </a:t>
+              <a:t>개발 일정 </a:t>
             </a:r>
             <a:r>
               <a:rPr lang="en-US" altLang="ko-KR" sz="4800" b="1" dirty="0" smtClean="0">
@@ -6538,10 +6504,6 @@
               </a:rPr>
               <a:t>2/2</a:t>
             </a:r>
-            <a:endParaRPr lang="en-US" altLang="ko-KR" sz="4800" b="1" dirty="0" smtClean="0">
-              <a:latin typeface="+mj-ea"/>
-              <a:ea typeface="+mj-ea"/>
-            </a:endParaRPr>
           </a:p>
         </p:txBody>
       </p:sp>
@@ -6642,11 +6604,7 @@
                       <a:pPr latinLnBrk="1"/>
                       <a:r>
                         <a:rPr lang="en-US" altLang="ko-KR" sz="1400" dirty="0" smtClean="0"/>
-                        <a:t>(</a:t>
-                      </a:r>
-                      <a:r>
-                        <a:rPr lang="en-US" altLang="ko-KR" sz="1400" dirty="0" smtClean="0"/>
-                        <a:t>10/29</a:t>
+                        <a:t>(10/29</a:t>
                       </a:r>
                       <a:r>
                         <a:rPr lang="en-US" altLang="ko-KR" sz="1400" baseline="0" dirty="0" smtClean="0"/>
@@ -6750,11 +6708,7 @@
                       <a:pPr latinLnBrk="1"/>
                       <a:r>
                         <a:rPr lang="en-US" altLang="ko-KR" sz="1400" dirty="0" smtClean="0"/>
-                        <a:t>(</a:t>
-                      </a:r>
-                      <a:r>
-                        <a:rPr lang="en-US" altLang="ko-KR" sz="1400" dirty="0" smtClean="0"/>
-                        <a:t>11/5</a:t>
+                        <a:t>(11/5</a:t>
                       </a:r>
                       <a:r>
                         <a:rPr lang="en-US" altLang="ko-KR" sz="1400" baseline="0" dirty="0" smtClean="0"/>
@@ -6865,11 +6819,7 @@
                       <a:pPr latinLnBrk="1"/>
                       <a:r>
                         <a:rPr lang="en-US" altLang="ko-KR" sz="1400" dirty="0" smtClean="0"/>
-                        <a:t>(</a:t>
-                      </a:r>
-                      <a:r>
-                        <a:rPr lang="en-US" altLang="ko-KR" sz="1400" dirty="0" smtClean="0"/>
-                        <a:t>11/12</a:t>
+                        <a:t>(11/12</a:t>
                       </a:r>
                       <a:r>
                         <a:rPr lang="en-US" altLang="ko-KR" sz="1400" baseline="0" dirty="0" smtClean="0"/>
@@ -6976,11 +6926,7 @@
                       <a:pPr latinLnBrk="1"/>
                       <a:r>
                         <a:rPr lang="en-US" altLang="ko-KR" sz="1400" dirty="0" smtClean="0"/>
-                        <a:t>(</a:t>
-                      </a:r>
-                      <a:r>
-                        <a:rPr lang="en-US" altLang="ko-KR" sz="1400" dirty="0" smtClean="0"/>
-                        <a:t>11/19</a:t>
+                        <a:t>(11/19</a:t>
                       </a:r>
                       <a:r>
                         <a:rPr lang="en-US" altLang="ko-KR" sz="1400" baseline="0" dirty="0" smtClean="0"/>
@@ -7091,11 +7037,7 @@
                       <a:pPr latinLnBrk="1"/>
                       <a:r>
                         <a:rPr lang="en-US" altLang="ko-KR" sz="1400" dirty="0" smtClean="0"/>
-                        <a:t>(</a:t>
-                      </a:r>
-                      <a:r>
-                        <a:rPr lang="en-US" altLang="ko-KR" sz="1400" dirty="0" smtClean="0"/>
-                        <a:t>11/26</a:t>
+                        <a:t>(11/26</a:t>
                       </a:r>
                       <a:r>
                         <a:rPr lang="en-US" altLang="ko-KR" sz="1400" baseline="0" dirty="0" smtClean="0"/>

</xml_diff>